<commit_message>
extra video en constructos uiteenhalen
</commit_message>
<xml_diff>
--- a/_SLIDES/DEEL2/les7_arays van objecten.pptx
+++ b/_SLIDES/DEEL2/les7_arays van objecten.pptx
@@ -235,7 +235,7 @@
           <a:p>
             <a:fld id="{659AD939-7AF9-4F38-A88A-0653EBBB44DE}" type="datetimeFigureOut">
               <a:rPr lang="nl-BE" smtClean="0"/>
-              <a:t>12/03/2019</a:t>
+              <a:t>8/03/2020</a:t>
             </a:fld>
             <a:endParaRPr lang="nl-BE"/>
           </a:p>
@@ -3531,7 +3531,7 @@
               <a:pPr>
                 <a:defRPr/>
               </a:pPr>
-              <a:t>3/12/2019</a:t>
+              <a:t>3/8/2020</a:t>
             </a:fld>
             <a:endParaRPr lang="en-CA"/>
           </a:p>
@@ -6065,7 +6065,7 @@
                 <a:ea typeface="+mn-ea"/>
                 <a:cs typeface="Arial" charset="0"/>
               </a:rPr>
-              <a:t>Les 7: Arrays van </a:t>
+              <a:t>Arrays van </a:t>
             </a:r>
             <a:r>
               <a:rPr kumimoji="0" lang="en-US" sz="2400" b="0" i="0" u="none" strike="noStrike" kern="1200" cap="none" spc="0" normalizeH="0" baseline="0" noProof="0" dirty="0" err="1">

</xml_diff>